<commit_message>
some bgm, sound effect, and bgm
</commit_message>
<xml_diff>
--- a/NotCode/Font & Dialogue Boxes/Game Title Screen.pptx
+++ b/NotCode/Font & Dialogue Boxes/Game Title Screen.pptx
@@ -262,7 +262,7 @@
           <a:p>
             <a:fld id="{ABE9399E-46BB-4CB9-85E3-CFF3274FF90B}" type="datetimeFigureOut">
               <a:rPr lang="en-SG" smtClean="0"/>
-              <a:t>14/3/2019</a:t>
+              <a:t>21/3/2019</a:t>
             </a:fld>
             <a:endParaRPr lang="en-SG"/>
           </a:p>
@@ -462,7 +462,7 @@
           <a:p>
             <a:fld id="{ABE9399E-46BB-4CB9-85E3-CFF3274FF90B}" type="datetimeFigureOut">
               <a:rPr lang="en-SG" smtClean="0"/>
-              <a:t>14/3/2019</a:t>
+              <a:t>21/3/2019</a:t>
             </a:fld>
             <a:endParaRPr lang="en-SG"/>
           </a:p>
@@ -672,7 +672,7 @@
           <a:p>
             <a:fld id="{ABE9399E-46BB-4CB9-85E3-CFF3274FF90B}" type="datetimeFigureOut">
               <a:rPr lang="en-SG" smtClean="0"/>
-              <a:t>14/3/2019</a:t>
+              <a:t>21/3/2019</a:t>
             </a:fld>
             <a:endParaRPr lang="en-SG"/>
           </a:p>
@@ -872,7 +872,7 @@
           <a:p>
             <a:fld id="{ABE9399E-46BB-4CB9-85E3-CFF3274FF90B}" type="datetimeFigureOut">
               <a:rPr lang="en-SG" smtClean="0"/>
-              <a:t>14/3/2019</a:t>
+              <a:t>21/3/2019</a:t>
             </a:fld>
             <a:endParaRPr lang="en-SG"/>
           </a:p>
@@ -1148,7 +1148,7 @@
           <a:p>
             <a:fld id="{ABE9399E-46BB-4CB9-85E3-CFF3274FF90B}" type="datetimeFigureOut">
               <a:rPr lang="en-SG" smtClean="0"/>
-              <a:t>14/3/2019</a:t>
+              <a:t>21/3/2019</a:t>
             </a:fld>
             <a:endParaRPr lang="en-SG"/>
           </a:p>
@@ -1416,7 +1416,7 @@
           <a:p>
             <a:fld id="{ABE9399E-46BB-4CB9-85E3-CFF3274FF90B}" type="datetimeFigureOut">
               <a:rPr lang="en-SG" smtClean="0"/>
-              <a:t>14/3/2019</a:t>
+              <a:t>21/3/2019</a:t>
             </a:fld>
             <a:endParaRPr lang="en-SG"/>
           </a:p>
@@ -1831,7 +1831,7 @@
           <a:p>
             <a:fld id="{ABE9399E-46BB-4CB9-85E3-CFF3274FF90B}" type="datetimeFigureOut">
               <a:rPr lang="en-SG" smtClean="0"/>
-              <a:t>14/3/2019</a:t>
+              <a:t>21/3/2019</a:t>
             </a:fld>
             <a:endParaRPr lang="en-SG"/>
           </a:p>
@@ -1973,7 +1973,7 @@
           <a:p>
             <a:fld id="{ABE9399E-46BB-4CB9-85E3-CFF3274FF90B}" type="datetimeFigureOut">
               <a:rPr lang="en-SG" smtClean="0"/>
-              <a:t>14/3/2019</a:t>
+              <a:t>21/3/2019</a:t>
             </a:fld>
             <a:endParaRPr lang="en-SG"/>
           </a:p>
@@ -2086,7 +2086,7 @@
           <a:p>
             <a:fld id="{ABE9399E-46BB-4CB9-85E3-CFF3274FF90B}" type="datetimeFigureOut">
               <a:rPr lang="en-SG" smtClean="0"/>
-              <a:t>14/3/2019</a:t>
+              <a:t>21/3/2019</a:t>
             </a:fld>
             <a:endParaRPr lang="en-SG"/>
           </a:p>
@@ -2399,7 +2399,7 @@
           <a:p>
             <a:fld id="{ABE9399E-46BB-4CB9-85E3-CFF3274FF90B}" type="datetimeFigureOut">
               <a:rPr lang="en-SG" smtClean="0"/>
-              <a:t>14/3/2019</a:t>
+              <a:t>21/3/2019</a:t>
             </a:fld>
             <a:endParaRPr lang="en-SG"/>
           </a:p>
@@ -2688,7 +2688,7 @@
           <a:p>
             <a:fld id="{ABE9399E-46BB-4CB9-85E3-CFF3274FF90B}" type="datetimeFigureOut">
               <a:rPr lang="en-SG" smtClean="0"/>
-              <a:t>14/3/2019</a:t>
+              <a:t>21/3/2019</a:t>
             </a:fld>
             <a:endParaRPr lang="en-SG"/>
           </a:p>
@@ -2931,7 +2931,7 @@
           <a:p>
             <a:fld id="{ABE9399E-46BB-4CB9-85E3-CFF3274FF90B}" type="datetimeFigureOut">
               <a:rPr lang="en-SG" smtClean="0"/>
-              <a:t>14/3/2019</a:t>
+              <a:t>21/3/2019</a:t>
             </a:fld>
             <a:endParaRPr lang="en-SG"/>
           </a:p>
@@ -3499,7 +3499,7 @@
     <p:bg>
       <p:bgPr>
         <a:solidFill>
-          <a:srgbClr val="333333"/>
+          <a:srgbClr val="2C2C2C"/>
         </a:solidFill>
         <a:effectLst/>
       </p:bgPr>
@@ -3520,10 +3520,10 @@
       </p:grpSpPr>
       <p:sp>
         <p:nvSpPr>
-          <p:cNvPr id="6" name="Rectangle: Rounded Corners 5">
-            <a:extLst>
-              <a:ext uri="{FF2B5EF4-FFF2-40B4-BE49-F238E27FC236}">
-                <a16:creationId xmlns:a16="http://schemas.microsoft.com/office/drawing/2014/main" id="{FA4C4764-0E22-47FA-9188-DE2D95FBDC57}"/>
+          <p:cNvPr id="13" name="Rectangle 12">
+            <a:extLst>
+              <a:ext uri="{FF2B5EF4-FFF2-40B4-BE49-F238E27FC236}">
+                <a16:creationId xmlns:a16="http://schemas.microsoft.com/office/drawing/2014/main" id="{E56FB417-FB2F-447D-874F-48562415B5E9}"/>
               </a:ext>
             </a:extLst>
           </p:cNvPr>
@@ -3532,24 +3532,21 @@
         </p:nvSpPr>
         <p:spPr>
           <a:xfrm>
-            <a:off x="390144" y="463296"/>
-            <a:ext cx="11436096" cy="2828544"/>
+            <a:off x="1644242" y="0"/>
+            <a:ext cx="8925886" cy="6858000"/>
           </a:xfrm>
-          <a:prstGeom prst="roundRect">
+          <a:prstGeom prst="rect">
             <a:avLst/>
           </a:prstGeom>
           <a:solidFill>
             <a:schemeClr val="tx1">
-              <a:lumMod val="75000"/>
-              <a:lumOff val="25000"/>
+              <a:lumMod val="85000"/>
+              <a:lumOff val="15000"/>
+              <a:alpha val="0"/>
             </a:schemeClr>
           </a:solidFill>
-          <a:ln w="57150">
-            <a:solidFill>
-              <a:schemeClr val="bg2">
-                <a:lumMod val="50000"/>
-              </a:schemeClr>
-            </a:solidFill>
+          <a:ln>
+            <a:noFill/>
           </a:ln>
         </p:spPr>
         <p:style>
@@ -3573,7 +3570,7 @@
           <a:lstStyle/>
           <a:p>
             <a:pPr algn="ctr"/>
-            <a:endParaRPr lang="en-SG" dirty="0"/>
+            <a:endParaRPr lang="en-SG"/>
           </a:p>
         </p:txBody>
       </p:sp>
@@ -3593,8 +3590,8 @@
         </p:nvSpPr>
         <p:spPr>
           <a:xfrm>
-            <a:off x="5425440" y="4351214"/>
-            <a:ext cx="1365504" cy="1171762"/>
+            <a:off x="3296773" y="3577550"/>
+            <a:ext cx="1925124" cy="2093976"/>
           </a:xfrm>
           <a:prstGeom prst="rect">
             <a:avLst/>
@@ -3816,6 +3813,39 @@
               </a:rPr>
               <a:t>Continue</a:t>
             </a:r>
+          </a:p>
+          <a:p>
+            <a:pPr marL="0" indent="0" algn="ctr">
+              <a:buNone/>
+            </a:pPr>
+            <a:endParaRPr lang="en-US" sz="2000" dirty="0">
+              <a:solidFill>
+                <a:schemeClr val="accent4">
+                  <a:lumMod val="60000"/>
+                  <a:lumOff val="40000"/>
+                </a:schemeClr>
+              </a:solidFill>
+              <a:latin typeface="White Rabbit" panose="00000009000000000000" pitchFamily="50" charset="0"/>
+              <a:cs typeface="White Rabbit" panose="00000009000000000000" pitchFamily="50" charset="0"/>
+            </a:endParaRPr>
+          </a:p>
+          <a:p>
+            <a:pPr marL="0" indent="0" algn="ctr">
+              <a:buNone/>
+            </a:pPr>
+            <a:r>
+              <a:rPr lang="en-US" sz="2000" dirty="0">
+                <a:solidFill>
+                  <a:schemeClr val="accent4">
+                    <a:lumMod val="60000"/>
+                    <a:lumOff val="40000"/>
+                  </a:schemeClr>
+                </a:solidFill>
+                <a:latin typeface="White Rabbit" panose="00000009000000000000" pitchFamily="50" charset="0"/>
+                <a:cs typeface="White Rabbit" panose="00000009000000000000" pitchFamily="50" charset="0"/>
+              </a:rPr>
+              <a:t>Multiplayer</a:t>
+            </a:r>
             <a:endParaRPr lang="en-SG" sz="2000" dirty="0">
               <a:solidFill>
                 <a:schemeClr val="accent4">
@@ -3831,10 +3861,10 @@
       </p:sp>
       <p:pic>
         <p:nvPicPr>
-          <p:cNvPr id="3" name="Picture 2">
-            <a:extLst>
-              <a:ext uri="{FF2B5EF4-FFF2-40B4-BE49-F238E27FC236}">
-                <a16:creationId xmlns:a16="http://schemas.microsoft.com/office/drawing/2014/main" id="{F5EADEA9-AEAA-4289-BB81-3D9D40FF9953}"/>
+          <p:cNvPr id="8" name="Picture 7">
+            <a:extLst>
+              <a:ext uri="{FF2B5EF4-FFF2-40B4-BE49-F238E27FC236}">
+                <a16:creationId xmlns:a16="http://schemas.microsoft.com/office/drawing/2014/main" id="{C720D50A-9C03-4F66-ABDF-B52950D540C7}"/>
               </a:ext>
             </a:extLst>
           </p:cNvPr>
@@ -3857,8 +3887,44 @@
         </p:blipFill>
         <p:spPr>
           <a:xfrm>
-            <a:off x="793615" y="916337"/>
-            <a:ext cx="10629155" cy="1922463"/>
+            <a:off x="2164842" y="1398471"/>
+            <a:ext cx="7886700" cy="1343025"/>
+          </a:xfrm>
+          <a:prstGeom prst="rect">
+            <a:avLst/>
+          </a:prstGeom>
+        </p:spPr>
+      </p:pic>
+      <p:pic>
+        <p:nvPicPr>
+          <p:cNvPr id="12" name="Picture 11">
+            <a:extLst>
+              <a:ext uri="{FF2B5EF4-FFF2-40B4-BE49-F238E27FC236}">
+                <a16:creationId xmlns:a16="http://schemas.microsoft.com/office/drawing/2014/main" id="{F6EA97CC-62AC-4FDD-BFE2-0B85F97D28E4}"/>
+              </a:ext>
+            </a:extLst>
+          </p:cNvPr>
+          <p:cNvPicPr>
+            <a:picLocks noChangeAspect="1"/>
+          </p:cNvPicPr>
+          <p:nvPr/>
+        </p:nvPicPr>
+        <p:blipFill>
+          <a:blip r:embed="rId3">
+            <a:extLst>
+              <a:ext uri="{28A0092B-C50C-407E-A947-70E740481C1C}">
+                <a14:useLocalDpi xmlns:a14="http://schemas.microsoft.com/office/drawing/2010/main" val="0"/>
+              </a:ext>
+            </a:extLst>
+          </a:blip>
+          <a:stretch>
+            <a:fillRect/>
+          </a:stretch>
+        </p:blipFill>
+        <p:spPr>
+          <a:xfrm>
+            <a:off x="6970105" y="3280449"/>
+            <a:ext cx="1925124" cy="2391077"/>
           </a:xfrm>
           <a:prstGeom prst="rect">
             <a:avLst/>

</xml_diff>

<commit_message>
title screen and multiplayer lobby added.
</commit_message>
<xml_diff>
--- a/NotCode/Font & Dialogue Boxes/Game Title Screen.pptx
+++ b/NotCode/Font & Dialogue Boxes/Game Title Screen.pptx
@@ -3887,7 +3887,7 @@
         </p:blipFill>
         <p:spPr>
           <a:xfrm>
-            <a:off x="2164842" y="1398471"/>
+            <a:off x="1278869" y="1398471"/>
             <a:ext cx="7886700" cy="1343025"/>
           </a:xfrm>
           <a:prstGeom prst="rect">
@@ -3923,8 +3923,8 @@
         </p:blipFill>
         <p:spPr>
           <a:xfrm>
-            <a:off x="6970105" y="3280449"/>
-            <a:ext cx="1925124" cy="2391077"/>
+            <a:off x="10204754" y="1833881"/>
+            <a:ext cx="730747" cy="907615"/>
           </a:xfrm>
           <a:prstGeom prst="rect">
             <a:avLst/>

</xml_diff>